<commit_message>
Ajout images manuelles secteur RN
</commit_message>
<xml_diff>
--- a/img/sign/ajout_signalisation.pptx
+++ b/img/sign/ajout_signalisation.pptx
@@ -262,7 +262,7 @@
           <a:p>
             <a:fld id="{14A5C780-BD00-8F4E-A1E3-BA0FDD6DF92F}" type="datetimeFigureOut">
               <a:rPr lang="fr-FR" smtClean="0"/>
-              <a:t>10/05/2023</a:t>
+              <a:t>12/05/2023</a:t>
             </a:fld>
             <a:endParaRPr lang="fr-FR"/>
           </a:p>
@@ -462,7 +462,7 @@
           <a:p>
             <a:fld id="{14A5C780-BD00-8F4E-A1E3-BA0FDD6DF92F}" type="datetimeFigureOut">
               <a:rPr lang="fr-FR" smtClean="0"/>
-              <a:t>10/05/2023</a:t>
+              <a:t>12/05/2023</a:t>
             </a:fld>
             <a:endParaRPr lang="fr-FR"/>
           </a:p>
@@ -672,7 +672,7 @@
           <a:p>
             <a:fld id="{14A5C780-BD00-8F4E-A1E3-BA0FDD6DF92F}" type="datetimeFigureOut">
               <a:rPr lang="fr-FR" smtClean="0"/>
-              <a:t>10/05/2023</a:t>
+              <a:t>12/05/2023</a:t>
             </a:fld>
             <a:endParaRPr lang="fr-FR"/>
           </a:p>
@@ -872,7 +872,7 @@
           <a:p>
             <a:fld id="{14A5C780-BD00-8F4E-A1E3-BA0FDD6DF92F}" type="datetimeFigureOut">
               <a:rPr lang="fr-FR" smtClean="0"/>
-              <a:t>10/05/2023</a:t>
+              <a:t>12/05/2023</a:t>
             </a:fld>
             <a:endParaRPr lang="fr-FR"/>
           </a:p>
@@ -1148,7 +1148,7 @@
           <a:p>
             <a:fld id="{14A5C780-BD00-8F4E-A1E3-BA0FDD6DF92F}" type="datetimeFigureOut">
               <a:rPr lang="fr-FR" smtClean="0"/>
-              <a:t>10/05/2023</a:t>
+              <a:t>12/05/2023</a:t>
             </a:fld>
             <a:endParaRPr lang="fr-FR"/>
           </a:p>
@@ -1416,7 +1416,7 @@
           <a:p>
             <a:fld id="{14A5C780-BD00-8F4E-A1E3-BA0FDD6DF92F}" type="datetimeFigureOut">
               <a:rPr lang="fr-FR" smtClean="0"/>
-              <a:t>10/05/2023</a:t>
+              <a:t>12/05/2023</a:t>
             </a:fld>
             <a:endParaRPr lang="fr-FR"/>
           </a:p>
@@ -1831,7 +1831,7 @@
           <a:p>
             <a:fld id="{14A5C780-BD00-8F4E-A1E3-BA0FDD6DF92F}" type="datetimeFigureOut">
               <a:rPr lang="fr-FR" smtClean="0"/>
-              <a:t>10/05/2023</a:t>
+              <a:t>12/05/2023</a:t>
             </a:fld>
             <a:endParaRPr lang="fr-FR"/>
           </a:p>
@@ -1973,7 +1973,7 @@
           <a:p>
             <a:fld id="{14A5C780-BD00-8F4E-A1E3-BA0FDD6DF92F}" type="datetimeFigureOut">
               <a:rPr lang="fr-FR" smtClean="0"/>
-              <a:t>10/05/2023</a:t>
+              <a:t>12/05/2023</a:t>
             </a:fld>
             <a:endParaRPr lang="fr-FR"/>
           </a:p>
@@ -2086,7 +2086,7 @@
           <a:p>
             <a:fld id="{14A5C780-BD00-8F4E-A1E3-BA0FDD6DF92F}" type="datetimeFigureOut">
               <a:rPr lang="fr-FR" smtClean="0"/>
-              <a:t>10/05/2023</a:t>
+              <a:t>12/05/2023</a:t>
             </a:fld>
             <a:endParaRPr lang="fr-FR"/>
           </a:p>
@@ -2399,7 +2399,7 @@
           <a:p>
             <a:fld id="{14A5C780-BD00-8F4E-A1E3-BA0FDD6DF92F}" type="datetimeFigureOut">
               <a:rPr lang="fr-FR" smtClean="0"/>
-              <a:t>10/05/2023</a:t>
+              <a:t>12/05/2023</a:t>
             </a:fld>
             <a:endParaRPr lang="fr-FR"/>
           </a:p>
@@ -2688,7 +2688,7 @@
           <a:p>
             <a:fld id="{14A5C780-BD00-8F4E-A1E3-BA0FDD6DF92F}" type="datetimeFigureOut">
               <a:rPr lang="fr-FR" smtClean="0"/>
-              <a:t>10/05/2023</a:t>
+              <a:t>12/05/2023</a:t>
             </a:fld>
             <a:endParaRPr lang="fr-FR"/>
           </a:p>
@@ -2931,7 +2931,7 @@
           <a:p>
             <a:fld id="{14A5C780-BD00-8F4E-A1E3-BA0FDD6DF92F}" type="datetimeFigureOut">
               <a:rPr lang="fr-FR" smtClean="0"/>
-              <a:t>10/05/2023</a:t>
+              <a:t>12/05/2023</a:t>
             </a:fld>
             <a:endParaRPr lang="fr-FR"/>
           </a:p>
@@ -3400,7 +3400,7 @@
         </p:blipFill>
         <p:spPr>
           <a:xfrm rot="2964501">
-            <a:off x="3387991" y="6103666"/>
+            <a:off x="4207259" y="3592522"/>
             <a:ext cx="608558" cy="608558"/>
           </a:xfrm>
           <a:prstGeom prst="rect">
@@ -3429,9 +3429,9 @@
           </a:stretch>
         </p:blipFill>
         <p:spPr>
-          <a:xfrm rot="20466497">
-            <a:off x="1818081" y="5814703"/>
-            <a:ext cx="977008" cy="909628"/>
+          <a:xfrm rot="21324382">
+            <a:off x="5098903" y="2890919"/>
+            <a:ext cx="1444739" cy="1345102"/>
           </a:xfrm>
           <a:prstGeom prst="rect">
             <a:avLst/>
@@ -3460,7 +3460,7 @@
         </p:blipFill>
         <p:spPr>
           <a:xfrm>
-            <a:off x="7209030" y="2266868"/>
+            <a:off x="9225456" y="6266173"/>
             <a:ext cx="778833" cy="525190"/>
           </a:xfrm>
           <a:prstGeom prst="rect">
@@ -3520,7 +3520,7 @@
         </p:blipFill>
         <p:spPr>
           <a:xfrm rot="218215">
-            <a:off x="5618171" y="1719322"/>
+            <a:off x="10743401" y="4791655"/>
             <a:ext cx="1221367" cy="1137135"/>
           </a:xfrm>
           <a:prstGeom prst="rect">
@@ -3610,7 +3610,7 @@
         </p:blipFill>
         <p:spPr>
           <a:xfrm flipH="1">
-            <a:off x="10569974" y="388546"/>
+            <a:off x="11480488" y="1168476"/>
             <a:ext cx="847073" cy="935463"/>
           </a:xfrm>
           <a:prstGeom prst="rect">

</xml_diff>

<commit_message>
Modif programmation staff CO 5
</commit_message>
<xml_diff>
--- a/img/sign/ajout_signalisation.pptx
+++ b/img/sign/ajout_signalisation.pptx
@@ -262,7 +262,7 @@
           <a:p>
             <a:fld id="{14A5C780-BD00-8F4E-A1E3-BA0FDD6DF92F}" type="datetimeFigureOut">
               <a:rPr lang="fr-FR" smtClean="0"/>
-              <a:t>12/05/2023</a:t>
+              <a:t>17/05/2023</a:t>
             </a:fld>
             <a:endParaRPr lang="fr-FR"/>
           </a:p>
@@ -462,7 +462,7 @@
           <a:p>
             <a:fld id="{14A5C780-BD00-8F4E-A1E3-BA0FDD6DF92F}" type="datetimeFigureOut">
               <a:rPr lang="fr-FR" smtClean="0"/>
-              <a:t>12/05/2023</a:t>
+              <a:t>17/05/2023</a:t>
             </a:fld>
             <a:endParaRPr lang="fr-FR"/>
           </a:p>
@@ -672,7 +672,7 @@
           <a:p>
             <a:fld id="{14A5C780-BD00-8F4E-A1E3-BA0FDD6DF92F}" type="datetimeFigureOut">
               <a:rPr lang="fr-FR" smtClean="0"/>
-              <a:t>12/05/2023</a:t>
+              <a:t>17/05/2023</a:t>
             </a:fld>
             <a:endParaRPr lang="fr-FR"/>
           </a:p>
@@ -872,7 +872,7 @@
           <a:p>
             <a:fld id="{14A5C780-BD00-8F4E-A1E3-BA0FDD6DF92F}" type="datetimeFigureOut">
               <a:rPr lang="fr-FR" smtClean="0"/>
-              <a:t>12/05/2023</a:t>
+              <a:t>17/05/2023</a:t>
             </a:fld>
             <a:endParaRPr lang="fr-FR"/>
           </a:p>
@@ -1148,7 +1148,7 @@
           <a:p>
             <a:fld id="{14A5C780-BD00-8F4E-A1E3-BA0FDD6DF92F}" type="datetimeFigureOut">
               <a:rPr lang="fr-FR" smtClean="0"/>
-              <a:t>12/05/2023</a:t>
+              <a:t>17/05/2023</a:t>
             </a:fld>
             <a:endParaRPr lang="fr-FR"/>
           </a:p>
@@ -1416,7 +1416,7 @@
           <a:p>
             <a:fld id="{14A5C780-BD00-8F4E-A1E3-BA0FDD6DF92F}" type="datetimeFigureOut">
               <a:rPr lang="fr-FR" smtClean="0"/>
-              <a:t>12/05/2023</a:t>
+              <a:t>17/05/2023</a:t>
             </a:fld>
             <a:endParaRPr lang="fr-FR"/>
           </a:p>
@@ -1831,7 +1831,7 @@
           <a:p>
             <a:fld id="{14A5C780-BD00-8F4E-A1E3-BA0FDD6DF92F}" type="datetimeFigureOut">
               <a:rPr lang="fr-FR" smtClean="0"/>
-              <a:t>12/05/2023</a:t>
+              <a:t>17/05/2023</a:t>
             </a:fld>
             <a:endParaRPr lang="fr-FR"/>
           </a:p>
@@ -1973,7 +1973,7 @@
           <a:p>
             <a:fld id="{14A5C780-BD00-8F4E-A1E3-BA0FDD6DF92F}" type="datetimeFigureOut">
               <a:rPr lang="fr-FR" smtClean="0"/>
-              <a:t>12/05/2023</a:t>
+              <a:t>17/05/2023</a:t>
             </a:fld>
             <a:endParaRPr lang="fr-FR"/>
           </a:p>
@@ -2086,7 +2086,7 @@
           <a:p>
             <a:fld id="{14A5C780-BD00-8F4E-A1E3-BA0FDD6DF92F}" type="datetimeFigureOut">
               <a:rPr lang="fr-FR" smtClean="0"/>
-              <a:t>12/05/2023</a:t>
+              <a:t>17/05/2023</a:t>
             </a:fld>
             <a:endParaRPr lang="fr-FR"/>
           </a:p>
@@ -2399,7 +2399,7 @@
           <a:p>
             <a:fld id="{14A5C780-BD00-8F4E-A1E3-BA0FDD6DF92F}" type="datetimeFigureOut">
               <a:rPr lang="fr-FR" smtClean="0"/>
-              <a:t>12/05/2023</a:t>
+              <a:t>17/05/2023</a:t>
             </a:fld>
             <a:endParaRPr lang="fr-FR"/>
           </a:p>
@@ -2688,7 +2688,7 @@
           <a:p>
             <a:fld id="{14A5C780-BD00-8F4E-A1E3-BA0FDD6DF92F}" type="datetimeFigureOut">
               <a:rPr lang="fr-FR" smtClean="0"/>
-              <a:t>12/05/2023</a:t>
+              <a:t>17/05/2023</a:t>
             </a:fld>
             <a:endParaRPr lang="fr-FR"/>
           </a:p>
@@ -2931,7 +2931,7 @@
           <a:p>
             <a:fld id="{14A5C780-BD00-8F4E-A1E3-BA0FDD6DF92F}" type="datetimeFigureOut">
               <a:rPr lang="fr-FR" smtClean="0"/>
-              <a:t>12/05/2023</a:t>
+              <a:t>17/05/2023</a:t>
             </a:fld>
             <a:endParaRPr lang="fr-FR"/>
           </a:p>
@@ -3370,7 +3370,7 @@
         </p:blipFill>
         <p:spPr>
           <a:xfrm rot="20765406">
-            <a:off x="3101046" y="5892342"/>
+            <a:off x="-97382" y="5841810"/>
             <a:ext cx="806804" cy="461340"/>
           </a:xfrm>
           <a:prstGeom prst="rect">
@@ -3400,7 +3400,7 @@
         </p:blipFill>
         <p:spPr>
           <a:xfrm rot="2964501">
-            <a:off x="4207259" y="3592522"/>
+            <a:off x="19723" y="3558394"/>
             <a:ext cx="608558" cy="608558"/>
           </a:xfrm>
           <a:prstGeom prst="rect">
@@ -3430,8 +3430,8 @@
         </p:blipFill>
         <p:spPr>
           <a:xfrm rot="21324382">
-            <a:off x="5098903" y="2890919"/>
-            <a:ext cx="1444739" cy="1345102"/>
+            <a:off x="6888498" y="5848146"/>
+            <a:ext cx="1041534" cy="969704"/>
           </a:xfrm>
           <a:prstGeom prst="rect">
             <a:avLst/>
@@ -3460,7 +3460,7 @@
         </p:blipFill>
         <p:spPr>
           <a:xfrm>
-            <a:off x="9225456" y="6266173"/>
+            <a:off x="11364776" y="3889800"/>
             <a:ext cx="778833" cy="525190"/>
           </a:xfrm>
           <a:prstGeom prst="rect">
@@ -3560,36 +3560,6 @@
       </p:pic>
       <p:pic>
         <p:nvPicPr>
-          <p:cNvPr id="2" name="Image 1">
-            <a:extLst>
-              <a:ext uri="{FF2B5EF4-FFF2-40B4-BE49-F238E27FC236}">
-                <a16:creationId xmlns:a16="http://schemas.microsoft.com/office/drawing/2014/main" id="{6D8F13AF-B2FD-BF1F-0572-3E566359B7F5}"/>
-              </a:ext>
-            </a:extLst>
-          </p:cNvPr>
-          <p:cNvPicPr>
-            <a:picLocks noChangeAspect="1"/>
-          </p:cNvPicPr>
-          <p:nvPr/>
-        </p:nvPicPr>
-        <p:blipFill>
-          <a:blip r:embed="rId5"/>
-          <a:stretch>
-            <a:fillRect/>
-          </a:stretch>
-        </p:blipFill>
-        <p:spPr>
-          <a:xfrm flipH="1">
-            <a:off x="4465898" y="5801786"/>
-            <a:ext cx="847073" cy="935463"/>
-          </a:xfrm>
-          <a:prstGeom prst="rect">
-            <a:avLst/>
-          </a:prstGeom>
-        </p:spPr>
-      </p:pic>
-      <p:pic>
-        <p:nvPicPr>
           <p:cNvPr id="31" name="Image 30">
             <a:extLst>
               <a:ext uri="{FF2B5EF4-FFF2-40B4-BE49-F238E27FC236}">
@@ -3611,6 +3581,36 @@
         <p:spPr>
           <a:xfrm flipH="1">
             <a:off x="11480488" y="1168476"/>
+            <a:ext cx="847073" cy="935463"/>
+          </a:xfrm>
+          <a:prstGeom prst="rect">
+            <a:avLst/>
+          </a:prstGeom>
+        </p:spPr>
+      </p:pic>
+      <p:pic>
+        <p:nvPicPr>
+          <p:cNvPr id="12" name="Image 11">
+            <a:extLst>
+              <a:ext uri="{FF2B5EF4-FFF2-40B4-BE49-F238E27FC236}">
+                <a16:creationId xmlns:a16="http://schemas.microsoft.com/office/drawing/2014/main" id="{90B7A030-3A93-5DA2-4A9C-3291E024E4D0}"/>
+              </a:ext>
+            </a:extLst>
+          </p:cNvPr>
+          <p:cNvPicPr>
+            <a:picLocks noChangeAspect="1"/>
+          </p:cNvPicPr>
+          <p:nvPr/>
+        </p:nvPicPr>
+        <p:blipFill>
+          <a:blip r:embed="rId5"/>
+          <a:stretch>
+            <a:fillRect/>
+          </a:stretch>
+        </p:blipFill>
+        <p:spPr>
+          <a:xfrm flipH="1">
+            <a:off x="1714027" y="5922537"/>
             <a:ext cx="847073" cy="935463"/>
           </a:xfrm>
           <a:prstGeom prst="rect">

</xml_diff>

<commit_message>
Début montage Etape 5,vref #46
- Ajout des images signalisations
- Ajout tableau Excel `signalisation.xlsx`
- Ajout détails des étapes course dans `itineraires.xlsx`
- Manque les `gpx` et `csv`
- Manque compilation en ajoutant l'étape 5 aux boucles de signalisation
</commit_message>
<xml_diff>
--- a/img/sign/ajout_signalisation.pptx
+++ b/img/sign/ajout_signalisation.pptx
@@ -262,7 +262,7 @@
           <a:p>
             <a:fld id="{14A5C780-BD00-8F4E-A1E3-BA0FDD6DF92F}" type="datetimeFigureOut">
               <a:rPr lang="fr-FR" smtClean="0"/>
-              <a:t>17/05/2023</a:t>
+              <a:t>24/05/2023</a:t>
             </a:fld>
             <a:endParaRPr lang="fr-FR"/>
           </a:p>
@@ -462,7 +462,7 @@
           <a:p>
             <a:fld id="{14A5C780-BD00-8F4E-A1E3-BA0FDD6DF92F}" type="datetimeFigureOut">
               <a:rPr lang="fr-FR" smtClean="0"/>
-              <a:t>17/05/2023</a:t>
+              <a:t>24/05/2023</a:t>
             </a:fld>
             <a:endParaRPr lang="fr-FR"/>
           </a:p>
@@ -672,7 +672,7 @@
           <a:p>
             <a:fld id="{14A5C780-BD00-8F4E-A1E3-BA0FDD6DF92F}" type="datetimeFigureOut">
               <a:rPr lang="fr-FR" smtClean="0"/>
-              <a:t>17/05/2023</a:t>
+              <a:t>24/05/2023</a:t>
             </a:fld>
             <a:endParaRPr lang="fr-FR"/>
           </a:p>
@@ -872,7 +872,7 @@
           <a:p>
             <a:fld id="{14A5C780-BD00-8F4E-A1E3-BA0FDD6DF92F}" type="datetimeFigureOut">
               <a:rPr lang="fr-FR" smtClean="0"/>
-              <a:t>17/05/2023</a:t>
+              <a:t>24/05/2023</a:t>
             </a:fld>
             <a:endParaRPr lang="fr-FR"/>
           </a:p>
@@ -1148,7 +1148,7 @@
           <a:p>
             <a:fld id="{14A5C780-BD00-8F4E-A1E3-BA0FDD6DF92F}" type="datetimeFigureOut">
               <a:rPr lang="fr-FR" smtClean="0"/>
-              <a:t>17/05/2023</a:t>
+              <a:t>24/05/2023</a:t>
             </a:fld>
             <a:endParaRPr lang="fr-FR"/>
           </a:p>
@@ -1416,7 +1416,7 @@
           <a:p>
             <a:fld id="{14A5C780-BD00-8F4E-A1E3-BA0FDD6DF92F}" type="datetimeFigureOut">
               <a:rPr lang="fr-FR" smtClean="0"/>
-              <a:t>17/05/2023</a:t>
+              <a:t>24/05/2023</a:t>
             </a:fld>
             <a:endParaRPr lang="fr-FR"/>
           </a:p>
@@ -1831,7 +1831,7 @@
           <a:p>
             <a:fld id="{14A5C780-BD00-8F4E-A1E3-BA0FDD6DF92F}" type="datetimeFigureOut">
               <a:rPr lang="fr-FR" smtClean="0"/>
-              <a:t>17/05/2023</a:t>
+              <a:t>24/05/2023</a:t>
             </a:fld>
             <a:endParaRPr lang="fr-FR"/>
           </a:p>
@@ -1973,7 +1973,7 @@
           <a:p>
             <a:fld id="{14A5C780-BD00-8F4E-A1E3-BA0FDD6DF92F}" type="datetimeFigureOut">
               <a:rPr lang="fr-FR" smtClean="0"/>
-              <a:t>17/05/2023</a:t>
+              <a:t>24/05/2023</a:t>
             </a:fld>
             <a:endParaRPr lang="fr-FR"/>
           </a:p>
@@ -2086,7 +2086,7 @@
           <a:p>
             <a:fld id="{14A5C780-BD00-8F4E-A1E3-BA0FDD6DF92F}" type="datetimeFigureOut">
               <a:rPr lang="fr-FR" smtClean="0"/>
-              <a:t>17/05/2023</a:t>
+              <a:t>24/05/2023</a:t>
             </a:fld>
             <a:endParaRPr lang="fr-FR"/>
           </a:p>
@@ -2399,7 +2399,7 @@
           <a:p>
             <a:fld id="{14A5C780-BD00-8F4E-A1E3-BA0FDD6DF92F}" type="datetimeFigureOut">
               <a:rPr lang="fr-FR" smtClean="0"/>
-              <a:t>17/05/2023</a:t>
+              <a:t>24/05/2023</a:t>
             </a:fld>
             <a:endParaRPr lang="fr-FR"/>
           </a:p>
@@ -2688,7 +2688,7 @@
           <a:p>
             <a:fld id="{14A5C780-BD00-8F4E-A1E3-BA0FDD6DF92F}" type="datetimeFigureOut">
               <a:rPr lang="fr-FR" smtClean="0"/>
-              <a:t>17/05/2023</a:t>
+              <a:t>24/05/2023</a:t>
             </a:fld>
             <a:endParaRPr lang="fr-FR"/>
           </a:p>
@@ -2931,7 +2931,7 @@
           <a:p>
             <a:fld id="{14A5C780-BD00-8F4E-A1E3-BA0FDD6DF92F}" type="datetimeFigureOut">
               <a:rPr lang="fr-FR" smtClean="0"/>
-              <a:t>17/05/2023</a:t>
+              <a:t>24/05/2023</a:t>
             </a:fld>
             <a:endParaRPr lang="fr-FR"/>
           </a:p>
@@ -3369,9 +3369,9 @@
           </a:stretch>
         </p:blipFill>
         <p:spPr>
-          <a:xfrm rot="20765406">
-            <a:off x="-97382" y="5841810"/>
-            <a:ext cx="806804" cy="461340"/>
+          <a:xfrm rot="20618481">
+            <a:off x="9301101" y="6371891"/>
+            <a:ext cx="1789734" cy="608400"/>
           </a:xfrm>
           <a:prstGeom prst="rect">
             <a:avLst/>
@@ -3400,7 +3400,7 @@
         </p:blipFill>
         <p:spPr>
           <a:xfrm rot="2964501">
-            <a:off x="19723" y="3558394"/>
+            <a:off x="161589" y="6457761"/>
             <a:ext cx="608558" cy="608558"/>
           </a:xfrm>
           <a:prstGeom prst="rect">
@@ -3429,9 +3429,9 @@
           </a:stretch>
         </p:blipFill>
         <p:spPr>
-          <a:xfrm rot="21324382">
-            <a:off x="6888498" y="5848146"/>
-            <a:ext cx="1041534" cy="969704"/>
+          <a:xfrm rot="190421">
+            <a:off x="3932230" y="1490785"/>
+            <a:ext cx="891726" cy="830228"/>
           </a:xfrm>
           <a:prstGeom prst="rect">
             <a:avLst/>
@@ -3460,7 +3460,7 @@
         </p:blipFill>
         <p:spPr>
           <a:xfrm>
-            <a:off x="11364776" y="3889800"/>
+            <a:off x="10922211" y="2425345"/>
             <a:ext cx="778833" cy="525190"/>
           </a:xfrm>
           <a:prstGeom prst="rect">
@@ -3519,9 +3519,9 @@
           </a:stretch>
         </p:blipFill>
         <p:spPr>
-          <a:xfrm rot="218215">
-            <a:off x="10743401" y="4791655"/>
-            <a:ext cx="1221367" cy="1137135"/>
+          <a:xfrm>
+            <a:off x="3534020" y="6457800"/>
+            <a:ext cx="1225261" cy="1140760"/>
           </a:xfrm>
           <a:prstGeom prst="rect">
             <a:avLst/>
@@ -3549,9 +3549,9 @@
           </a:stretch>
         </p:blipFill>
         <p:spPr>
-          <a:xfrm rot="20696228">
-            <a:off x="10840939" y="5919909"/>
-            <a:ext cx="305142" cy="305142"/>
+          <a:xfrm rot="2574015">
+            <a:off x="11699247" y="5289756"/>
+            <a:ext cx="427513" cy="427513"/>
           </a:xfrm>
           <a:prstGeom prst="rect">
             <a:avLst/>
@@ -3610,8 +3610,98 @@
         </p:blipFill>
         <p:spPr>
           <a:xfrm flipH="1">
-            <a:off x="1714027" y="5922537"/>
-            <a:ext cx="847073" cy="935463"/>
+            <a:off x="6498723" y="6305761"/>
+            <a:ext cx="762757" cy="842349"/>
+          </a:xfrm>
+          <a:prstGeom prst="rect">
+            <a:avLst/>
+          </a:prstGeom>
+        </p:spPr>
+      </p:pic>
+      <p:pic>
+        <p:nvPicPr>
+          <p:cNvPr id="25" name="Image 24">
+            <a:extLst>
+              <a:ext uri="{FF2B5EF4-FFF2-40B4-BE49-F238E27FC236}">
+                <a16:creationId xmlns:a16="http://schemas.microsoft.com/office/drawing/2014/main" id="{578CB788-856E-515D-6AB4-48C409990D97}"/>
+              </a:ext>
+            </a:extLst>
+          </p:cNvPr>
+          <p:cNvPicPr>
+            <a:picLocks noChangeAspect="1"/>
+          </p:cNvPicPr>
+          <p:nvPr/>
+        </p:nvPicPr>
+        <p:blipFill>
+          <a:blip r:embed="rId5"/>
+          <a:stretch>
+            <a:fillRect/>
+          </a:stretch>
+        </p:blipFill>
+        <p:spPr>
+          <a:xfrm flipH="1">
+            <a:off x="7432718" y="6185831"/>
+            <a:ext cx="762757" cy="842349"/>
+          </a:xfrm>
+          <a:prstGeom prst="rect">
+            <a:avLst/>
+          </a:prstGeom>
+        </p:spPr>
+      </p:pic>
+      <p:pic>
+        <p:nvPicPr>
+          <p:cNvPr id="26" name="Image 25">
+            <a:extLst>
+              <a:ext uri="{FF2B5EF4-FFF2-40B4-BE49-F238E27FC236}">
+                <a16:creationId xmlns:a16="http://schemas.microsoft.com/office/drawing/2014/main" id="{E404C2FF-B5C4-C1E0-5ABE-15273418568D}"/>
+              </a:ext>
+            </a:extLst>
+          </p:cNvPr>
+          <p:cNvPicPr>
+            <a:picLocks noChangeAspect="1"/>
+          </p:cNvPicPr>
+          <p:nvPr/>
+        </p:nvPicPr>
+        <p:blipFill>
+          <a:blip r:embed="rId5"/>
+          <a:stretch>
+            <a:fillRect/>
+          </a:stretch>
+        </p:blipFill>
+        <p:spPr>
+          <a:xfrm flipH="1">
+            <a:off x="5239789" y="6332997"/>
+            <a:ext cx="762757" cy="842349"/>
+          </a:xfrm>
+          <a:prstGeom prst="rect">
+            <a:avLst/>
+          </a:prstGeom>
+        </p:spPr>
+      </p:pic>
+      <p:pic>
+        <p:nvPicPr>
+          <p:cNvPr id="27" name="Image 26">
+            <a:extLst>
+              <a:ext uri="{FF2B5EF4-FFF2-40B4-BE49-F238E27FC236}">
+                <a16:creationId xmlns:a16="http://schemas.microsoft.com/office/drawing/2014/main" id="{544900C8-4B92-596F-384A-264340BD6CC7}"/>
+              </a:ext>
+            </a:extLst>
+          </p:cNvPr>
+          <p:cNvPicPr>
+            <a:picLocks noChangeAspect="1"/>
+          </p:cNvPicPr>
+          <p:nvPr/>
+        </p:nvPicPr>
+        <p:blipFill>
+          <a:blip r:embed="rId5"/>
+          <a:stretch>
+            <a:fillRect/>
+          </a:stretch>
+        </p:blipFill>
+        <p:spPr>
+          <a:xfrm flipH="1">
+            <a:off x="5714621" y="6125542"/>
+            <a:ext cx="762757" cy="842349"/>
           </a:xfrm>
           <a:prstGeom prst="rect">
             <a:avLst/>
@@ -3670,7 +3760,7 @@
         </p:blipFill>
         <p:spPr>
           <a:xfrm>
-            <a:off x="6486765" y="3429000"/>
+            <a:off x="2563351" y="6544339"/>
             <a:ext cx="1092458" cy="1092458"/>
           </a:xfrm>
           <a:prstGeom prst="rect">
@@ -3760,7 +3850,7 @@
         </p:blipFill>
         <p:spPr>
           <a:xfrm flipH="1">
-            <a:off x="4122406" y="2963917"/>
+            <a:off x="188359" y="6242269"/>
             <a:ext cx="1115103" cy="1231461"/>
           </a:xfrm>
           <a:prstGeom prst="rect">

</xml_diff>

<commit_message>
Ajout images et description signalisation, ref #48
</commit_message>
<xml_diff>
--- a/img/sign/ajout_signalisation.pptx
+++ b/img/sign/ajout_signalisation.pptx
@@ -262,7 +262,7 @@
           <a:p>
             <a:fld id="{14A5C780-BD00-8F4E-A1E3-BA0FDD6DF92F}" type="datetimeFigureOut">
               <a:rPr lang="fr-FR" smtClean="0"/>
-              <a:t>24/05/2023</a:t>
+              <a:t>28/05/2023</a:t>
             </a:fld>
             <a:endParaRPr lang="fr-FR"/>
           </a:p>
@@ -462,7 +462,7 @@
           <a:p>
             <a:fld id="{14A5C780-BD00-8F4E-A1E3-BA0FDD6DF92F}" type="datetimeFigureOut">
               <a:rPr lang="fr-FR" smtClean="0"/>
-              <a:t>24/05/2023</a:t>
+              <a:t>28/05/2023</a:t>
             </a:fld>
             <a:endParaRPr lang="fr-FR"/>
           </a:p>
@@ -672,7 +672,7 @@
           <a:p>
             <a:fld id="{14A5C780-BD00-8F4E-A1E3-BA0FDD6DF92F}" type="datetimeFigureOut">
               <a:rPr lang="fr-FR" smtClean="0"/>
-              <a:t>24/05/2023</a:t>
+              <a:t>28/05/2023</a:t>
             </a:fld>
             <a:endParaRPr lang="fr-FR"/>
           </a:p>
@@ -872,7 +872,7 @@
           <a:p>
             <a:fld id="{14A5C780-BD00-8F4E-A1E3-BA0FDD6DF92F}" type="datetimeFigureOut">
               <a:rPr lang="fr-FR" smtClean="0"/>
-              <a:t>24/05/2023</a:t>
+              <a:t>28/05/2023</a:t>
             </a:fld>
             <a:endParaRPr lang="fr-FR"/>
           </a:p>
@@ -1148,7 +1148,7 @@
           <a:p>
             <a:fld id="{14A5C780-BD00-8F4E-A1E3-BA0FDD6DF92F}" type="datetimeFigureOut">
               <a:rPr lang="fr-FR" smtClean="0"/>
-              <a:t>24/05/2023</a:t>
+              <a:t>28/05/2023</a:t>
             </a:fld>
             <a:endParaRPr lang="fr-FR"/>
           </a:p>
@@ -1416,7 +1416,7 @@
           <a:p>
             <a:fld id="{14A5C780-BD00-8F4E-A1E3-BA0FDD6DF92F}" type="datetimeFigureOut">
               <a:rPr lang="fr-FR" smtClean="0"/>
-              <a:t>24/05/2023</a:t>
+              <a:t>28/05/2023</a:t>
             </a:fld>
             <a:endParaRPr lang="fr-FR"/>
           </a:p>
@@ -1831,7 +1831,7 @@
           <a:p>
             <a:fld id="{14A5C780-BD00-8F4E-A1E3-BA0FDD6DF92F}" type="datetimeFigureOut">
               <a:rPr lang="fr-FR" smtClean="0"/>
-              <a:t>24/05/2023</a:t>
+              <a:t>28/05/2023</a:t>
             </a:fld>
             <a:endParaRPr lang="fr-FR"/>
           </a:p>
@@ -1973,7 +1973,7 @@
           <a:p>
             <a:fld id="{14A5C780-BD00-8F4E-A1E3-BA0FDD6DF92F}" type="datetimeFigureOut">
               <a:rPr lang="fr-FR" smtClean="0"/>
-              <a:t>24/05/2023</a:t>
+              <a:t>28/05/2023</a:t>
             </a:fld>
             <a:endParaRPr lang="fr-FR"/>
           </a:p>
@@ -2086,7 +2086,7 @@
           <a:p>
             <a:fld id="{14A5C780-BD00-8F4E-A1E3-BA0FDD6DF92F}" type="datetimeFigureOut">
               <a:rPr lang="fr-FR" smtClean="0"/>
-              <a:t>24/05/2023</a:t>
+              <a:t>28/05/2023</a:t>
             </a:fld>
             <a:endParaRPr lang="fr-FR"/>
           </a:p>
@@ -2399,7 +2399,7 @@
           <a:p>
             <a:fld id="{14A5C780-BD00-8F4E-A1E3-BA0FDD6DF92F}" type="datetimeFigureOut">
               <a:rPr lang="fr-FR" smtClean="0"/>
-              <a:t>24/05/2023</a:t>
+              <a:t>28/05/2023</a:t>
             </a:fld>
             <a:endParaRPr lang="fr-FR"/>
           </a:p>
@@ -2688,7 +2688,7 @@
           <a:p>
             <a:fld id="{14A5C780-BD00-8F4E-A1E3-BA0FDD6DF92F}" type="datetimeFigureOut">
               <a:rPr lang="fr-FR" smtClean="0"/>
-              <a:t>24/05/2023</a:t>
+              <a:t>28/05/2023</a:t>
             </a:fld>
             <a:endParaRPr lang="fr-FR"/>
           </a:p>
@@ -2931,7 +2931,7 @@
           <a:p>
             <a:fld id="{14A5C780-BD00-8F4E-A1E3-BA0FDD6DF92F}" type="datetimeFigureOut">
               <a:rPr lang="fr-FR" smtClean="0"/>
-              <a:t>24/05/2023</a:t>
+              <a:t>28/05/2023</a:t>
             </a:fld>
             <a:endParaRPr lang="fr-FR"/>
           </a:p>
@@ -3399,9 +3399,9 @@
           </a:stretch>
         </p:blipFill>
         <p:spPr>
-          <a:xfrm rot="2964501">
-            <a:off x="161589" y="6457761"/>
-            <a:ext cx="608558" cy="608558"/>
+          <a:xfrm rot="20066773">
+            <a:off x="306920" y="6613831"/>
+            <a:ext cx="1639161" cy="608558"/>
           </a:xfrm>
           <a:prstGeom prst="rect">
             <a:avLst/>
@@ -3429,9 +3429,9 @@
           </a:stretch>
         </p:blipFill>
         <p:spPr>
-          <a:xfrm rot="190421">
-            <a:off x="3932230" y="1490785"/>
-            <a:ext cx="891726" cy="830228"/>
+          <a:xfrm>
+            <a:off x="7682360" y="1841734"/>
+            <a:ext cx="1050276" cy="977844"/>
           </a:xfrm>
           <a:prstGeom prst="rect">
             <a:avLst/>
@@ -3459,9 +3459,9 @@
           </a:stretch>
         </p:blipFill>
         <p:spPr>
-          <a:xfrm>
-            <a:off x="10922211" y="2425345"/>
-            <a:ext cx="778833" cy="525190"/>
+          <a:xfrm rot="503574">
+            <a:off x="2028011" y="7107924"/>
+            <a:ext cx="1400678" cy="305815"/>
           </a:xfrm>
           <a:prstGeom prst="rect">
             <a:avLst/>
@@ -3490,7 +3490,7 @@
         </p:blipFill>
         <p:spPr>
           <a:xfrm rot="21393759">
-            <a:off x="11677609" y="501333"/>
+            <a:off x="10209136" y="7141305"/>
             <a:ext cx="452832" cy="452832"/>
           </a:xfrm>
           <a:prstGeom prst="rect">
@@ -3519,9 +3519,9 @@
           </a:stretch>
         </p:blipFill>
         <p:spPr>
-          <a:xfrm>
-            <a:off x="3534020" y="6457800"/>
-            <a:ext cx="1225261" cy="1140760"/>
+          <a:xfrm rot="184264">
+            <a:off x="7090589" y="5992389"/>
+            <a:ext cx="1004756" cy="935463"/>
           </a:xfrm>
           <a:prstGeom prst="rect">
             <a:avLst/>
@@ -3549,9 +3549,9 @@
           </a:stretch>
         </p:blipFill>
         <p:spPr>
-          <a:xfrm rot="2574015">
-            <a:off x="11699247" y="5289756"/>
-            <a:ext cx="427513" cy="427513"/>
+          <a:xfrm rot="19518280">
+            <a:off x="11408015" y="6056527"/>
+            <a:ext cx="303628" cy="303628"/>
           </a:xfrm>
           <a:prstGeom prst="rect">
             <a:avLst/>
@@ -3580,7 +3580,7 @@
         </p:blipFill>
         <p:spPr>
           <a:xfrm flipH="1">
-            <a:off x="11480488" y="1168476"/>
+            <a:off x="11258856" y="6610695"/>
             <a:ext cx="847073" cy="935463"/>
           </a:xfrm>
           <a:prstGeom prst="rect">
@@ -3610,8 +3610,8 @@
         </p:blipFill>
         <p:spPr>
           <a:xfrm flipH="1">
-            <a:off x="6498723" y="6305761"/>
-            <a:ext cx="762757" cy="842349"/>
+            <a:off x="2238876" y="6442860"/>
+            <a:ext cx="461559" cy="509722"/>
           </a:xfrm>
           <a:prstGeom prst="rect">
             <a:avLst/>
@@ -3640,7 +3640,7 @@
         </p:blipFill>
         <p:spPr>
           <a:xfrm flipH="1">
-            <a:off x="7432718" y="6185831"/>
+            <a:off x="8732636" y="7207111"/>
             <a:ext cx="762757" cy="842349"/>
           </a:xfrm>
           <a:prstGeom prst="rect">
@@ -3670,8 +3670,8 @@
         </p:blipFill>
         <p:spPr>
           <a:xfrm flipH="1">
-            <a:off x="5239789" y="6332997"/>
-            <a:ext cx="762757" cy="842349"/>
+            <a:off x="5061355" y="7007340"/>
+            <a:ext cx="635888" cy="702241"/>
           </a:xfrm>
           <a:prstGeom prst="rect">
             <a:avLst/>
@@ -3700,8 +3700,188 @@
         </p:blipFill>
         <p:spPr>
           <a:xfrm flipH="1">
-            <a:off x="5714621" y="6125542"/>
-            <a:ext cx="762757" cy="842349"/>
+            <a:off x="4425467" y="7007340"/>
+            <a:ext cx="635888" cy="702241"/>
+          </a:xfrm>
+          <a:prstGeom prst="rect">
+            <a:avLst/>
+          </a:prstGeom>
+        </p:spPr>
+      </p:pic>
+      <p:pic>
+        <p:nvPicPr>
+          <p:cNvPr id="20" name="Image 19">
+            <a:extLst>
+              <a:ext uri="{FF2B5EF4-FFF2-40B4-BE49-F238E27FC236}">
+                <a16:creationId xmlns:a16="http://schemas.microsoft.com/office/drawing/2014/main" id="{913916C1-970E-7893-FE18-BDFFFD727BE7}"/>
+              </a:ext>
+            </a:extLst>
+          </p:cNvPr>
+          <p:cNvPicPr>
+            <a:picLocks noChangeAspect="1"/>
+          </p:cNvPicPr>
+          <p:nvPr/>
+        </p:nvPicPr>
+        <p:blipFill>
+          <a:blip r:embed="rId5"/>
+          <a:stretch>
+            <a:fillRect/>
+          </a:stretch>
+        </p:blipFill>
+        <p:spPr>
+          <a:xfrm flipH="1">
+            <a:off x="7643714" y="6966641"/>
+            <a:ext cx="606468" cy="669752"/>
+          </a:xfrm>
+          <a:prstGeom prst="rect">
+            <a:avLst/>
+          </a:prstGeom>
+        </p:spPr>
+      </p:pic>
+      <p:pic>
+        <p:nvPicPr>
+          <p:cNvPr id="22" name="Image 21">
+            <a:extLst>
+              <a:ext uri="{FF2B5EF4-FFF2-40B4-BE49-F238E27FC236}">
+                <a16:creationId xmlns:a16="http://schemas.microsoft.com/office/drawing/2014/main" id="{534298ED-BF7A-F3AA-05BF-B5144B07A866}"/>
+              </a:ext>
+            </a:extLst>
+          </p:cNvPr>
+          <p:cNvPicPr>
+            <a:picLocks noChangeAspect="1"/>
+          </p:cNvPicPr>
+          <p:nvPr/>
+        </p:nvPicPr>
+        <p:blipFill>
+          <a:blip r:embed="rId5"/>
+          <a:stretch>
+            <a:fillRect/>
+          </a:stretch>
+        </p:blipFill>
+        <p:spPr>
+          <a:xfrm flipH="1">
+            <a:off x="5112911" y="5950399"/>
+            <a:ext cx="461559" cy="509722"/>
+          </a:xfrm>
+          <a:prstGeom prst="rect">
+            <a:avLst/>
+          </a:prstGeom>
+        </p:spPr>
+      </p:pic>
+      <p:pic>
+        <p:nvPicPr>
+          <p:cNvPr id="32" name="Image 31">
+            <a:extLst>
+              <a:ext uri="{FF2B5EF4-FFF2-40B4-BE49-F238E27FC236}">
+                <a16:creationId xmlns:a16="http://schemas.microsoft.com/office/drawing/2014/main" id="{0DAAB89E-08D4-0B68-5370-6BACED7DE0DB}"/>
+              </a:ext>
+            </a:extLst>
+          </p:cNvPr>
+          <p:cNvPicPr>
+            <a:picLocks noChangeAspect="1"/>
+          </p:cNvPicPr>
+          <p:nvPr/>
+        </p:nvPicPr>
+        <p:blipFill>
+          <a:blip r:embed="rId5"/>
+          <a:stretch>
+            <a:fillRect/>
+          </a:stretch>
+        </p:blipFill>
+        <p:spPr>
+          <a:xfrm flipH="1">
+            <a:off x="4564286" y="6158873"/>
+            <a:ext cx="461559" cy="509722"/>
+          </a:xfrm>
+          <a:prstGeom prst="rect">
+            <a:avLst/>
+          </a:prstGeom>
+        </p:spPr>
+      </p:pic>
+      <p:pic>
+        <p:nvPicPr>
+          <p:cNvPr id="33" name="Image 32">
+            <a:extLst>
+              <a:ext uri="{FF2B5EF4-FFF2-40B4-BE49-F238E27FC236}">
+                <a16:creationId xmlns:a16="http://schemas.microsoft.com/office/drawing/2014/main" id="{4727F5C0-2C12-B788-99E5-96346BF516CB}"/>
+              </a:ext>
+            </a:extLst>
+          </p:cNvPr>
+          <p:cNvPicPr>
+            <a:picLocks noChangeAspect="1"/>
+          </p:cNvPicPr>
+          <p:nvPr/>
+        </p:nvPicPr>
+        <p:blipFill>
+          <a:blip r:embed="rId5"/>
+          <a:stretch>
+            <a:fillRect/>
+          </a:stretch>
+        </p:blipFill>
+        <p:spPr>
+          <a:xfrm flipH="1">
+            <a:off x="3897908" y="6460121"/>
+            <a:ext cx="461559" cy="509722"/>
+          </a:xfrm>
+          <a:prstGeom prst="rect">
+            <a:avLst/>
+          </a:prstGeom>
+        </p:spPr>
+      </p:pic>
+      <p:pic>
+        <p:nvPicPr>
+          <p:cNvPr id="35" name="Image 34">
+            <a:extLst>
+              <a:ext uri="{FF2B5EF4-FFF2-40B4-BE49-F238E27FC236}">
+                <a16:creationId xmlns:a16="http://schemas.microsoft.com/office/drawing/2014/main" id="{DFBFAC93-2283-3B5A-B904-1A53BB86E16F}"/>
+              </a:ext>
+            </a:extLst>
+          </p:cNvPr>
+          <p:cNvPicPr>
+            <a:picLocks noChangeAspect="1"/>
+          </p:cNvPicPr>
+          <p:nvPr/>
+        </p:nvPicPr>
+        <p:blipFill>
+          <a:blip r:embed="rId5"/>
+          <a:stretch>
+            <a:fillRect/>
+          </a:stretch>
+        </p:blipFill>
+        <p:spPr>
+          <a:xfrm flipH="1">
+            <a:off x="2998631" y="6858000"/>
+            <a:ext cx="461559" cy="509722"/>
+          </a:xfrm>
+          <a:prstGeom prst="rect">
+            <a:avLst/>
+          </a:prstGeom>
+        </p:spPr>
+      </p:pic>
+      <p:pic>
+        <p:nvPicPr>
+          <p:cNvPr id="36" name="Image 35">
+            <a:extLst>
+              <a:ext uri="{FF2B5EF4-FFF2-40B4-BE49-F238E27FC236}">
+                <a16:creationId xmlns:a16="http://schemas.microsoft.com/office/drawing/2014/main" id="{0C8E7A79-2675-922F-4F2E-0FE2A3663BBD}"/>
+              </a:ext>
+            </a:extLst>
+          </p:cNvPr>
+          <p:cNvPicPr>
+            <a:picLocks noChangeAspect="1"/>
+          </p:cNvPicPr>
+          <p:nvPr/>
+        </p:nvPicPr>
+        <p:blipFill>
+          <a:blip r:embed="rId5"/>
+          <a:stretch>
+            <a:fillRect/>
+          </a:stretch>
+        </p:blipFill>
+        <p:spPr>
+          <a:xfrm flipH="1">
+            <a:off x="1948847" y="7160533"/>
+            <a:ext cx="461559" cy="509722"/>
           </a:xfrm>
           <a:prstGeom prst="rect">
             <a:avLst/>

</xml_diff>